<commit_message>
Developer Guide: Added UML diagram for UserProfile
</commit_message>
<xml_diff>
--- a/docs/diagrams/ModelComponentClassDiagram.pptx
+++ b/docs/diagrams/ModelComponentClassDiagram.pptx
@@ -208,7 +208,7 @@
           <a:p>
             <a:fld id="{F5CC4B3F-88C1-4FFA-B1B6-F41C21DC6924}" type="datetimeFigureOut">
               <a:rPr lang="en-US" smtClean="0"/>
-              <a:t>1/1/18</a:t>
+              <a:t>4/8/18</a:t>
             </a:fld>
             <a:endParaRPr lang="en-US"/>
           </a:p>
@@ -272,38 +272,37 @@
           <a:p>
             <a:pPr lvl="0"/>
             <a:r>
-              <a:rPr lang="en-US" smtClean="0"/>
+              <a:rPr lang="en-US"/>
               <a:t>Click to edit Master text styles</a:t>
             </a:r>
           </a:p>
           <a:p>
             <a:pPr lvl="1"/>
             <a:r>
-              <a:rPr lang="en-US" smtClean="0"/>
+              <a:rPr lang="en-US"/>
               <a:t>Second level</a:t>
             </a:r>
           </a:p>
           <a:p>
             <a:pPr lvl="2"/>
             <a:r>
-              <a:rPr lang="en-US" smtClean="0"/>
+              <a:rPr lang="en-US"/>
               <a:t>Third level</a:t>
             </a:r>
           </a:p>
           <a:p>
             <a:pPr lvl="3"/>
             <a:r>
-              <a:rPr lang="en-US" smtClean="0"/>
+              <a:rPr lang="en-US"/>
               <a:t>Fourth level</a:t>
             </a:r>
           </a:p>
           <a:p>
             <a:pPr lvl="4"/>
             <a:r>
-              <a:rPr lang="en-US" smtClean="0"/>
+              <a:rPr lang="en-US"/>
               <a:t>Fifth level</a:t>
             </a:r>
-            <a:endParaRPr lang="en-US"/>
           </a:p>
         </p:txBody>
       </p:sp>
@@ -514,10 +513,9 @@
           <a:lstStyle/>
           <a:p>
             <a:r>
-              <a:rPr lang="en-US" smtClean="0"/>
+              <a:rPr lang="en-US"/>
               <a:t>Click to edit Master title style</a:t>
             </a:r>
-            <a:endParaRPr lang="en-US"/>
           </a:p>
         </p:txBody>
       </p:sp>
@@ -633,10 +631,9 @@
           </a:lstStyle>
           <a:p>
             <a:r>
-              <a:rPr lang="en-US" smtClean="0"/>
+              <a:rPr lang="en-US"/>
               <a:t>Click to edit Master subtitle style</a:t>
             </a:r>
-            <a:endParaRPr lang="en-US"/>
           </a:p>
         </p:txBody>
       </p:sp>
@@ -657,7 +654,7 @@
           <a:p>
             <a:fld id="{78C97017-6FC3-485B-9764-EAC9E56C1D49}" type="datetimeFigureOut">
               <a:rPr lang="en-US" smtClean="0"/>
-              <a:t>1/1/18</a:t>
+              <a:t>4/8/18</a:t>
             </a:fld>
             <a:endParaRPr lang="en-US"/>
           </a:p>
@@ -751,10 +748,9 @@
           <a:lstStyle/>
           <a:p>
             <a:r>
-              <a:rPr lang="en-US" smtClean="0"/>
+              <a:rPr lang="en-US"/>
               <a:t>Click to edit Master title style</a:t>
             </a:r>
-            <a:endParaRPr lang="en-US"/>
           </a:p>
         </p:txBody>
       </p:sp>
@@ -775,38 +771,37 @@
           <a:p>
             <a:pPr lvl="0"/>
             <a:r>
-              <a:rPr lang="en-US" smtClean="0"/>
+              <a:rPr lang="en-US"/>
               <a:t>Click to edit Master text styles</a:t>
             </a:r>
           </a:p>
           <a:p>
             <a:pPr lvl="1"/>
             <a:r>
-              <a:rPr lang="en-US" smtClean="0"/>
+              <a:rPr lang="en-US"/>
               <a:t>Second level</a:t>
             </a:r>
           </a:p>
           <a:p>
             <a:pPr lvl="2"/>
             <a:r>
-              <a:rPr lang="en-US" smtClean="0"/>
+              <a:rPr lang="en-US"/>
               <a:t>Third level</a:t>
             </a:r>
           </a:p>
           <a:p>
             <a:pPr lvl="3"/>
             <a:r>
-              <a:rPr lang="en-US" smtClean="0"/>
+              <a:rPr lang="en-US"/>
               <a:t>Fourth level</a:t>
             </a:r>
           </a:p>
           <a:p>
             <a:pPr lvl="4"/>
             <a:r>
-              <a:rPr lang="en-US" smtClean="0"/>
+              <a:rPr lang="en-US"/>
               <a:t>Fifth level</a:t>
             </a:r>
-            <a:endParaRPr lang="en-US"/>
           </a:p>
         </p:txBody>
       </p:sp>
@@ -827,7 +822,7 @@
           <a:p>
             <a:fld id="{78C97017-6FC3-485B-9764-EAC9E56C1D49}" type="datetimeFigureOut">
               <a:rPr lang="en-US" smtClean="0"/>
-              <a:t>1/1/18</a:t>
+              <a:t>4/8/18</a:t>
             </a:fld>
             <a:endParaRPr lang="en-US"/>
           </a:p>
@@ -926,10 +921,9 @@
           <a:lstStyle/>
           <a:p>
             <a:r>
-              <a:rPr lang="en-US" smtClean="0"/>
+              <a:rPr lang="en-US"/>
               <a:t>Click to edit Master title style</a:t>
             </a:r>
-            <a:endParaRPr lang="en-US"/>
           </a:p>
         </p:txBody>
       </p:sp>
@@ -955,38 +949,37 @@
           <a:p>
             <a:pPr lvl="0"/>
             <a:r>
-              <a:rPr lang="en-US" smtClean="0"/>
+              <a:rPr lang="en-US"/>
               <a:t>Click to edit Master text styles</a:t>
             </a:r>
           </a:p>
           <a:p>
             <a:pPr lvl="1"/>
             <a:r>
-              <a:rPr lang="en-US" smtClean="0"/>
+              <a:rPr lang="en-US"/>
               <a:t>Second level</a:t>
             </a:r>
           </a:p>
           <a:p>
             <a:pPr lvl="2"/>
             <a:r>
-              <a:rPr lang="en-US" smtClean="0"/>
+              <a:rPr lang="en-US"/>
               <a:t>Third level</a:t>
             </a:r>
           </a:p>
           <a:p>
             <a:pPr lvl="3"/>
             <a:r>
-              <a:rPr lang="en-US" smtClean="0"/>
+              <a:rPr lang="en-US"/>
               <a:t>Fourth level</a:t>
             </a:r>
           </a:p>
           <a:p>
             <a:pPr lvl="4"/>
             <a:r>
-              <a:rPr lang="en-US" smtClean="0"/>
+              <a:rPr lang="en-US"/>
               <a:t>Fifth level</a:t>
             </a:r>
-            <a:endParaRPr lang="en-US"/>
           </a:p>
         </p:txBody>
       </p:sp>
@@ -1007,7 +1000,7 @@
           <a:p>
             <a:fld id="{78C97017-6FC3-485B-9764-EAC9E56C1D49}" type="datetimeFigureOut">
               <a:rPr lang="en-US" smtClean="0"/>
-              <a:t>1/1/18</a:t>
+              <a:t>4/8/18</a:t>
             </a:fld>
             <a:endParaRPr lang="en-US"/>
           </a:p>
@@ -1101,10 +1094,9 @@
           <a:lstStyle/>
           <a:p>
             <a:r>
-              <a:rPr lang="en-US" smtClean="0"/>
+              <a:rPr lang="en-US"/>
               <a:t>Click to edit Master title style</a:t>
             </a:r>
-            <a:endParaRPr lang="en-US"/>
           </a:p>
         </p:txBody>
       </p:sp>
@@ -1125,38 +1117,37 @@
           <a:p>
             <a:pPr lvl="0"/>
             <a:r>
-              <a:rPr lang="en-US" smtClean="0"/>
+              <a:rPr lang="en-US"/>
               <a:t>Click to edit Master text styles</a:t>
             </a:r>
           </a:p>
           <a:p>
             <a:pPr lvl="1"/>
             <a:r>
-              <a:rPr lang="en-US" smtClean="0"/>
+              <a:rPr lang="en-US"/>
               <a:t>Second level</a:t>
             </a:r>
           </a:p>
           <a:p>
             <a:pPr lvl="2"/>
             <a:r>
-              <a:rPr lang="en-US" smtClean="0"/>
+              <a:rPr lang="en-US"/>
               <a:t>Third level</a:t>
             </a:r>
           </a:p>
           <a:p>
             <a:pPr lvl="3"/>
             <a:r>
-              <a:rPr lang="en-US" smtClean="0"/>
+              <a:rPr lang="en-US"/>
               <a:t>Fourth level</a:t>
             </a:r>
           </a:p>
           <a:p>
             <a:pPr lvl="4"/>
             <a:r>
-              <a:rPr lang="en-US" smtClean="0"/>
+              <a:rPr lang="en-US"/>
               <a:t>Fifth level</a:t>
             </a:r>
-            <a:endParaRPr lang="en-US"/>
           </a:p>
         </p:txBody>
       </p:sp>
@@ -1177,7 +1168,7 @@
           <a:p>
             <a:fld id="{78C97017-6FC3-485B-9764-EAC9E56C1D49}" type="datetimeFigureOut">
               <a:rPr lang="en-US" smtClean="0"/>
-              <a:t>1/1/18</a:t>
+              <a:t>4/8/18</a:t>
             </a:fld>
             <a:endParaRPr lang="en-US"/>
           </a:p>
@@ -1280,10 +1271,9 @@
           </a:lstStyle>
           <a:p>
             <a:r>
-              <a:rPr lang="en-US" smtClean="0"/>
+              <a:rPr lang="en-US"/>
               <a:t>Click to edit Master title style</a:t>
             </a:r>
-            <a:endParaRPr lang="en-US"/>
           </a:p>
         </p:txBody>
       </p:sp>
@@ -1400,7 +1390,7 @@
           <a:p>
             <a:pPr lvl="0"/>
             <a:r>
-              <a:rPr lang="en-US" smtClean="0"/>
+              <a:rPr lang="en-US"/>
               <a:t>Click to edit Master text styles</a:t>
             </a:r>
           </a:p>
@@ -1423,7 +1413,7 @@
           <a:p>
             <a:fld id="{78C97017-6FC3-485B-9764-EAC9E56C1D49}" type="datetimeFigureOut">
               <a:rPr lang="en-US" smtClean="0"/>
-              <a:t>1/1/18</a:t>
+              <a:t>4/8/18</a:t>
             </a:fld>
             <a:endParaRPr lang="en-US"/>
           </a:p>
@@ -1517,10 +1507,9 @@
           <a:lstStyle/>
           <a:p>
             <a:r>
-              <a:rPr lang="en-US" smtClean="0"/>
+              <a:rPr lang="en-US"/>
               <a:t>Click to edit Master title style</a:t>
             </a:r>
-            <a:endParaRPr lang="en-US"/>
           </a:p>
         </p:txBody>
       </p:sp>
@@ -1574,38 +1563,37 @@
           <a:p>
             <a:pPr lvl="0"/>
             <a:r>
-              <a:rPr lang="en-US" smtClean="0"/>
+              <a:rPr lang="en-US"/>
               <a:t>Click to edit Master text styles</a:t>
             </a:r>
           </a:p>
           <a:p>
             <a:pPr lvl="1"/>
             <a:r>
-              <a:rPr lang="en-US" smtClean="0"/>
+              <a:rPr lang="en-US"/>
               <a:t>Second level</a:t>
             </a:r>
           </a:p>
           <a:p>
             <a:pPr lvl="2"/>
             <a:r>
-              <a:rPr lang="en-US" smtClean="0"/>
+              <a:rPr lang="en-US"/>
               <a:t>Third level</a:t>
             </a:r>
           </a:p>
           <a:p>
             <a:pPr lvl="3"/>
             <a:r>
-              <a:rPr lang="en-US" smtClean="0"/>
+              <a:rPr lang="en-US"/>
               <a:t>Fourth level</a:t>
             </a:r>
           </a:p>
           <a:p>
             <a:pPr lvl="4"/>
             <a:r>
-              <a:rPr lang="en-US" smtClean="0"/>
+              <a:rPr lang="en-US"/>
               <a:t>Fifth level</a:t>
             </a:r>
-            <a:endParaRPr lang="en-US"/>
           </a:p>
         </p:txBody>
       </p:sp>
@@ -1659,38 +1647,37 @@
           <a:p>
             <a:pPr lvl="0"/>
             <a:r>
-              <a:rPr lang="en-US" smtClean="0"/>
+              <a:rPr lang="en-US"/>
               <a:t>Click to edit Master text styles</a:t>
             </a:r>
           </a:p>
           <a:p>
             <a:pPr lvl="1"/>
             <a:r>
-              <a:rPr lang="en-US" smtClean="0"/>
+              <a:rPr lang="en-US"/>
               <a:t>Second level</a:t>
             </a:r>
           </a:p>
           <a:p>
             <a:pPr lvl="2"/>
             <a:r>
-              <a:rPr lang="en-US" smtClean="0"/>
+              <a:rPr lang="en-US"/>
               <a:t>Third level</a:t>
             </a:r>
           </a:p>
           <a:p>
             <a:pPr lvl="3"/>
             <a:r>
-              <a:rPr lang="en-US" smtClean="0"/>
+              <a:rPr lang="en-US"/>
               <a:t>Fourth level</a:t>
             </a:r>
           </a:p>
           <a:p>
             <a:pPr lvl="4"/>
             <a:r>
-              <a:rPr lang="en-US" smtClean="0"/>
+              <a:rPr lang="en-US"/>
               <a:t>Fifth level</a:t>
             </a:r>
-            <a:endParaRPr lang="en-US"/>
           </a:p>
         </p:txBody>
       </p:sp>
@@ -1711,7 +1698,7 @@
           <a:p>
             <a:fld id="{78C97017-6FC3-485B-9764-EAC9E56C1D49}" type="datetimeFigureOut">
               <a:rPr lang="en-US" smtClean="0"/>
-              <a:t>1/1/18</a:t>
+              <a:t>4/8/18</a:t>
             </a:fld>
             <a:endParaRPr lang="en-US"/>
           </a:p>
@@ -1809,10 +1796,9 @@
           </a:lstStyle>
           <a:p>
             <a:r>
-              <a:rPr lang="en-US" smtClean="0"/>
+              <a:rPr lang="en-US"/>
               <a:t>Click to edit Master title style</a:t>
             </a:r>
-            <a:endParaRPr lang="en-US"/>
           </a:p>
         </p:txBody>
       </p:sp>
@@ -1875,7 +1861,7 @@
           <a:p>
             <a:pPr lvl="0"/>
             <a:r>
-              <a:rPr lang="en-US" smtClean="0"/>
+              <a:rPr lang="en-US"/>
               <a:t>Click to edit Master text styles</a:t>
             </a:r>
           </a:p>
@@ -1931,38 +1917,37 @@
           <a:p>
             <a:pPr lvl="0"/>
             <a:r>
-              <a:rPr lang="en-US" smtClean="0"/>
+              <a:rPr lang="en-US"/>
               <a:t>Click to edit Master text styles</a:t>
             </a:r>
           </a:p>
           <a:p>
             <a:pPr lvl="1"/>
             <a:r>
-              <a:rPr lang="en-US" smtClean="0"/>
+              <a:rPr lang="en-US"/>
               <a:t>Second level</a:t>
             </a:r>
           </a:p>
           <a:p>
             <a:pPr lvl="2"/>
             <a:r>
-              <a:rPr lang="en-US" smtClean="0"/>
+              <a:rPr lang="en-US"/>
               <a:t>Third level</a:t>
             </a:r>
           </a:p>
           <a:p>
             <a:pPr lvl="3"/>
             <a:r>
-              <a:rPr lang="en-US" smtClean="0"/>
+              <a:rPr lang="en-US"/>
               <a:t>Fourth level</a:t>
             </a:r>
           </a:p>
           <a:p>
             <a:pPr lvl="4"/>
             <a:r>
-              <a:rPr lang="en-US" smtClean="0"/>
+              <a:rPr lang="en-US"/>
               <a:t>Fifth level</a:t>
             </a:r>
-            <a:endParaRPr lang="en-US"/>
           </a:p>
         </p:txBody>
       </p:sp>
@@ -2025,7 +2010,7 @@
           <a:p>
             <a:pPr lvl="0"/>
             <a:r>
-              <a:rPr lang="en-US" smtClean="0"/>
+              <a:rPr lang="en-US"/>
               <a:t>Click to edit Master text styles</a:t>
             </a:r>
           </a:p>
@@ -2081,38 +2066,37 @@
           <a:p>
             <a:pPr lvl="0"/>
             <a:r>
-              <a:rPr lang="en-US" smtClean="0"/>
+              <a:rPr lang="en-US"/>
               <a:t>Click to edit Master text styles</a:t>
             </a:r>
           </a:p>
           <a:p>
             <a:pPr lvl="1"/>
             <a:r>
-              <a:rPr lang="en-US" smtClean="0"/>
+              <a:rPr lang="en-US"/>
               <a:t>Second level</a:t>
             </a:r>
           </a:p>
           <a:p>
             <a:pPr lvl="2"/>
             <a:r>
-              <a:rPr lang="en-US" smtClean="0"/>
+              <a:rPr lang="en-US"/>
               <a:t>Third level</a:t>
             </a:r>
           </a:p>
           <a:p>
             <a:pPr lvl="3"/>
             <a:r>
-              <a:rPr lang="en-US" smtClean="0"/>
+              <a:rPr lang="en-US"/>
               <a:t>Fourth level</a:t>
             </a:r>
           </a:p>
           <a:p>
             <a:pPr lvl="4"/>
             <a:r>
-              <a:rPr lang="en-US" smtClean="0"/>
+              <a:rPr lang="en-US"/>
               <a:t>Fifth level</a:t>
             </a:r>
-            <a:endParaRPr lang="en-US"/>
           </a:p>
         </p:txBody>
       </p:sp>
@@ -2133,7 +2117,7 @@
           <a:p>
             <a:fld id="{78C97017-6FC3-485B-9764-EAC9E56C1D49}" type="datetimeFigureOut">
               <a:rPr lang="en-US" smtClean="0"/>
-              <a:t>1/1/18</a:t>
+              <a:t>4/8/18</a:t>
             </a:fld>
             <a:endParaRPr lang="en-US"/>
           </a:p>
@@ -2227,10 +2211,9 @@
           <a:lstStyle/>
           <a:p>
             <a:r>
-              <a:rPr lang="en-US" smtClean="0"/>
+              <a:rPr lang="en-US"/>
               <a:t>Click to edit Master title style</a:t>
             </a:r>
-            <a:endParaRPr lang="en-US"/>
           </a:p>
         </p:txBody>
       </p:sp>
@@ -2251,7 +2234,7 @@
           <a:p>
             <a:fld id="{78C97017-6FC3-485B-9764-EAC9E56C1D49}" type="datetimeFigureOut">
               <a:rPr lang="en-US" smtClean="0"/>
-              <a:t>1/1/18</a:t>
+              <a:t>4/8/18</a:t>
             </a:fld>
             <a:endParaRPr lang="en-US"/>
           </a:p>
@@ -2346,7 +2329,7 @@
           <a:p>
             <a:fld id="{78C97017-6FC3-485B-9764-EAC9E56C1D49}" type="datetimeFigureOut">
               <a:rPr lang="en-US" smtClean="0"/>
-              <a:t>1/1/18</a:t>
+              <a:t>4/8/18</a:t>
             </a:fld>
             <a:endParaRPr lang="en-US"/>
           </a:p>
@@ -2449,10 +2432,9 @@
           </a:lstStyle>
           <a:p>
             <a:r>
-              <a:rPr lang="en-US" smtClean="0"/>
+              <a:rPr lang="en-US"/>
               <a:t>Click to edit Master title style</a:t>
             </a:r>
-            <a:endParaRPr lang="en-US"/>
           </a:p>
         </p:txBody>
       </p:sp>
@@ -2506,38 +2488,37 @@
           <a:p>
             <a:pPr lvl="0"/>
             <a:r>
-              <a:rPr lang="en-US" smtClean="0"/>
+              <a:rPr lang="en-US"/>
               <a:t>Click to edit Master text styles</a:t>
             </a:r>
           </a:p>
           <a:p>
             <a:pPr lvl="1"/>
             <a:r>
-              <a:rPr lang="en-US" smtClean="0"/>
+              <a:rPr lang="en-US"/>
               <a:t>Second level</a:t>
             </a:r>
           </a:p>
           <a:p>
             <a:pPr lvl="2"/>
             <a:r>
-              <a:rPr lang="en-US" smtClean="0"/>
+              <a:rPr lang="en-US"/>
               <a:t>Third level</a:t>
             </a:r>
           </a:p>
           <a:p>
             <a:pPr lvl="3"/>
             <a:r>
-              <a:rPr lang="en-US" smtClean="0"/>
+              <a:rPr lang="en-US"/>
               <a:t>Fourth level</a:t>
             </a:r>
           </a:p>
           <a:p>
             <a:pPr lvl="4"/>
             <a:r>
-              <a:rPr lang="en-US" smtClean="0"/>
+              <a:rPr lang="en-US"/>
               <a:t>Fifth level</a:t>
             </a:r>
-            <a:endParaRPr lang="en-US"/>
           </a:p>
         </p:txBody>
       </p:sp>
@@ -2600,7 +2581,7 @@
           <a:p>
             <a:pPr lvl="0"/>
             <a:r>
-              <a:rPr lang="en-US" smtClean="0"/>
+              <a:rPr lang="en-US"/>
               <a:t>Click to edit Master text styles</a:t>
             </a:r>
           </a:p>
@@ -2623,7 +2604,7 @@
           <a:p>
             <a:fld id="{78C97017-6FC3-485B-9764-EAC9E56C1D49}" type="datetimeFigureOut">
               <a:rPr lang="en-US" smtClean="0"/>
-              <a:t>1/1/18</a:t>
+              <a:t>4/8/18</a:t>
             </a:fld>
             <a:endParaRPr lang="en-US"/>
           </a:p>
@@ -2726,10 +2707,9 @@
           </a:lstStyle>
           <a:p>
             <a:r>
-              <a:rPr lang="en-US" smtClean="0"/>
+              <a:rPr lang="en-US"/>
               <a:t>Click to edit Master title style</a:t>
             </a:r>
-            <a:endParaRPr lang="en-US"/>
           </a:p>
         </p:txBody>
       </p:sp>
@@ -2853,7 +2833,7 @@
           <a:p>
             <a:pPr lvl="0"/>
             <a:r>
-              <a:rPr lang="en-US" smtClean="0"/>
+              <a:rPr lang="en-US"/>
               <a:t>Click to edit Master text styles</a:t>
             </a:r>
           </a:p>
@@ -2876,7 +2856,7 @@
           <a:p>
             <a:fld id="{78C97017-6FC3-485B-9764-EAC9E56C1D49}" type="datetimeFigureOut">
               <a:rPr lang="en-US" smtClean="0"/>
-              <a:t>1/1/18</a:t>
+              <a:t>4/8/18</a:t>
             </a:fld>
             <a:endParaRPr lang="en-US"/>
           </a:p>
@@ -2985,10 +2965,9 @@
           <a:lstStyle/>
           <a:p>
             <a:r>
-              <a:rPr lang="en-US" smtClean="0"/>
+              <a:rPr lang="en-US"/>
               <a:t>Click to edit Master title style</a:t>
             </a:r>
-            <a:endParaRPr lang="en-US"/>
           </a:p>
         </p:txBody>
       </p:sp>
@@ -3019,38 +2998,37 @@
           <a:p>
             <a:pPr lvl="0"/>
             <a:r>
-              <a:rPr lang="en-US" smtClean="0"/>
+              <a:rPr lang="en-US"/>
               <a:t>Click to edit Master text styles</a:t>
             </a:r>
           </a:p>
           <a:p>
             <a:pPr lvl="1"/>
             <a:r>
-              <a:rPr lang="en-US" smtClean="0"/>
+              <a:rPr lang="en-US"/>
               <a:t>Second level</a:t>
             </a:r>
           </a:p>
           <a:p>
             <a:pPr lvl="2"/>
             <a:r>
-              <a:rPr lang="en-US" smtClean="0"/>
+              <a:rPr lang="en-US"/>
               <a:t>Third level</a:t>
             </a:r>
           </a:p>
           <a:p>
             <a:pPr lvl="3"/>
             <a:r>
-              <a:rPr lang="en-US" smtClean="0"/>
+              <a:rPr lang="en-US"/>
               <a:t>Fourth level</a:t>
             </a:r>
           </a:p>
           <a:p>
             <a:pPr lvl="4"/>
             <a:r>
-              <a:rPr lang="en-US" smtClean="0"/>
+              <a:rPr lang="en-US"/>
               <a:t>Fifth level</a:t>
             </a:r>
-            <a:endParaRPr lang="en-US"/>
           </a:p>
         </p:txBody>
       </p:sp>
@@ -3089,7 +3067,7 @@
           <a:p>
             <a:fld id="{78C97017-6FC3-485B-9764-EAC9E56C1D49}" type="datetimeFigureOut">
               <a:rPr lang="en-US" smtClean="0"/>
-              <a:t>1/1/18</a:t>
+              <a:t>4/8/18</a:t>
             </a:fld>
             <a:endParaRPr lang="en-US"/>
           </a:p>
@@ -3473,7 +3451,7 @@
         <p:spPr>
           <a:xfrm>
             <a:off x="1119865" y="1727200"/>
-            <a:ext cx="7490735" cy="2997200"/>
+            <a:ext cx="7490735" cy="3759200"/>
           </a:xfrm>
           <a:prstGeom prst="roundRect">
             <a:avLst>
@@ -3510,7 +3488,7 @@
           <a:lstStyle/>
           <a:p>
             <a:r>
-              <a:rPr lang="en-US" sz="1200" b="1" dirty="0" smtClean="0">
+              <a:rPr lang="en-US" sz="1200" b="1" dirty="0">
                 <a:solidFill>
                   <a:srgbClr val="7030A0"/>
                 </a:solidFill>
@@ -3569,7 +3547,7 @@
           <a:p>
             <a:pPr algn="ctr"/>
             <a:r>
-              <a:rPr lang="en-US" sz="1050" dirty="0" err="1" smtClean="0">
+              <a:rPr lang="en-US" sz="1050" dirty="0" err="1">
                 <a:solidFill>
                   <a:schemeClr val="bg1"/>
                 </a:solidFill>
@@ -3628,7 +3606,7 @@
           <a:p>
             <a:pPr algn="ctr"/>
             <a:r>
-              <a:rPr lang="en-US" sz="1050" dirty="0" err="1" smtClean="0">
+              <a:rPr lang="en-US" sz="1050" dirty="0" err="1">
                 <a:solidFill>
                   <a:schemeClr val="bg1"/>
                 </a:solidFill>
@@ -3658,7 +3636,7 @@
           </a:xfrm>
           <a:prstGeom prst="bentConnector4">
             <a:avLst>
-              <a:gd name="adj1" fmla="val -101829"/>
+              <a:gd name="adj1" fmla="val -120226"/>
               <a:gd name="adj2" fmla="val 99976"/>
             </a:avLst>
           </a:prstGeom>
@@ -3742,7 +3720,7 @@
           <a:p>
             <a:pPr algn="ctr"/>
             <a:r>
-              <a:rPr lang="en-US" sz="1050" dirty="0" smtClean="0">
+              <a:rPr lang="en-US" sz="1050" dirty="0">
                 <a:solidFill>
                   <a:schemeClr val="bg1"/>
                 </a:solidFill>
@@ -4015,7 +3993,7 @@
           <a:p>
             <a:pPr algn="ctr"/>
             <a:r>
-              <a:rPr lang="en-US" sz="1050" dirty="0" err="1" smtClean="0">
+              <a:rPr lang="en-US" sz="1050" dirty="0" err="1">
                 <a:solidFill>
                   <a:srgbClr val="7030A0"/>
                 </a:solidFill>
@@ -4157,12 +4135,12 @@
           <a:p>
             <a:pPr algn="ctr"/>
             <a:r>
-              <a:rPr lang="en-US" sz="1050" dirty="0" err="1" smtClean="0">
+              <a:rPr lang="en-US" sz="1050" dirty="0" err="1">
                 <a:solidFill>
                   <a:srgbClr val="7030A0"/>
                 </a:solidFill>
               </a:rPr>
-              <a:t>UniquePersonList</a:t>
+              <a:t>UniqueFoodList</a:t>
             </a:r>
             <a:endParaRPr lang="en-SG" sz="1050" dirty="0">
               <a:solidFill>
@@ -4301,12 +4279,12 @@
           <a:p>
             <a:pPr algn="ctr"/>
             <a:r>
-              <a:rPr lang="en-US" sz="1050" dirty="0" err="1" smtClean="0">
+              <a:rPr lang="en-US" sz="1050" dirty="0" err="1">
                 <a:solidFill>
                   <a:srgbClr val="7030A0"/>
                 </a:solidFill>
               </a:rPr>
-              <a:t>UniqueTagList</a:t>
+              <a:t>UniqueFoodList</a:t>
             </a:r>
             <a:endParaRPr lang="en-SG" sz="1050" dirty="0">
               <a:solidFill>
@@ -4400,12 +4378,12 @@
           <a:p>
             <a:pPr algn="ctr"/>
             <a:r>
-              <a:rPr lang="en-US" sz="1050" dirty="0" smtClean="0">
+              <a:rPr lang="en-US" sz="1050" dirty="0">
                 <a:solidFill>
                   <a:srgbClr val="7030A0"/>
                 </a:solidFill>
               </a:rPr>
-              <a:t>Person</a:t>
+              <a:t>Food</a:t>
             </a:r>
             <a:endParaRPr lang="en-SG" sz="1050" dirty="0">
               <a:solidFill>
@@ -4542,7 +4520,7 @@
           <a:p>
             <a:pPr algn="ctr"/>
             <a:r>
-              <a:rPr lang="en-US" sz="1050" dirty="0" smtClean="0">
+              <a:rPr lang="en-US" sz="1050" dirty="0">
                 <a:solidFill>
                   <a:srgbClr val="7030A0"/>
                 </a:solidFill>
@@ -4651,7 +4629,7 @@
         </p:nvSpPr>
         <p:spPr>
           <a:xfrm>
-            <a:off x="7712397" y="2564238"/>
+            <a:off x="7686208" y="2591591"/>
             <a:ext cx="708186" cy="285783"/>
           </a:xfrm>
           <a:prstGeom prst="rect">
@@ -4684,7 +4662,7 @@
           <a:p>
             <a:pPr algn="ctr"/>
             <a:r>
-              <a:rPr lang="en-US" sz="1050" dirty="0" smtClean="0">
+              <a:rPr lang="en-US" sz="1050" dirty="0">
                 <a:solidFill>
                   <a:srgbClr val="7030A0"/>
                 </a:solidFill>
@@ -4707,7 +4685,7 @@
         </p:nvSpPr>
         <p:spPr>
           <a:xfrm>
-            <a:off x="7041947" y="2948201"/>
+            <a:off x="7015758" y="2975554"/>
             <a:ext cx="236048" cy="173380"/>
           </a:xfrm>
           <a:prstGeom prst="flowChartDecision">
@@ -4757,7 +4735,7 @@
         </p:nvCxnSpPr>
         <p:spPr>
           <a:xfrm flipV="1">
-            <a:off x="7277995" y="2707130"/>
+            <a:off x="7251806" y="2734483"/>
             <a:ext cx="434402" cy="327761"/>
           </a:xfrm>
           <a:prstGeom prst="bentConnector3">
@@ -4795,7 +4773,7 @@
         </p:nvSpPr>
         <p:spPr>
           <a:xfrm>
-            <a:off x="7712397" y="2887216"/>
+            <a:off x="7686208" y="2914569"/>
             <a:ext cx="708186" cy="285783"/>
           </a:xfrm>
           <a:prstGeom prst="rect">
@@ -4828,7 +4806,7 @@
           <a:p>
             <a:pPr algn="ctr"/>
             <a:r>
-              <a:rPr lang="en-US" sz="1050" dirty="0" smtClean="0">
+              <a:rPr lang="en-US" sz="1050" dirty="0">
                 <a:solidFill>
                   <a:srgbClr val="7030A0"/>
                 </a:solidFill>
@@ -4854,7 +4832,7 @@
         </p:nvCxnSpPr>
         <p:spPr>
           <a:xfrm flipV="1">
-            <a:off x="7277995" y="3030108"/>
+            <a:off x="7251806" y="3057461"/>
             <a:ext cx="434402" cy="4783"/>
           </a:xfrm>
           <a:prstGeom prst="bentConnector3">
@@ -4892,7 +4870,7 @@
         </p:nvSpPr>
         <p:spPr>
           <a:xfrm>
-            <a:off x="7712397" y="3210194"/>
+            <a:off x="7686208" y="3237547"/>
             <a:ext cx="708186" cy="285783"/>
           </a:xfrm>
           <a:prstGeom prst="rect">
@@ -4925,7 +4903,7 @@
           <a:p>
             <a:pPr algn="ctr"/>
             <a:r>
-              <a:rPr lang="en-US" sz="1050" dirty="0" smtClean="0">
+              <a:rPr lang="en-US" sz="1050" dirty="0">
                 <a:solidFill>
                   <a:srgbClr val="7030A0"/>
                 </a:solidFill>
@@ -4951,7 +4929,7 @@
         </p:nvCxnSpPr>
         <p:spPr>
           <a:xfrm>
-            <a:off x="7277995" y="3034891"/>
+            <a:off x="7251806" y="3062244"/>
             <a:ext cx="434402" cy="318195"/>
           </a:xfrm>
           <a:prstGeom prst="bentConnector3">
@@ -4989,7 +4967,7 @@
         </p:nvSpPr>
         <p:spPr>
           <a:xfrm>
-            <a:off x="7712397" y="3533171"/>
+            <a:off x="7686208" y="3560524"/>
             <a:ext cx="708186" cy="285783"/>
           </a:xfrm>
           <a:prstGeom prst="rect">
@@ -5022,7 +5000,7 @@
           <a:p>
             <a:pPr algn="ctr"/>
             <a:r>
-              <a:rPr lang="en-US" sz="1050" dirty="0" smtClean="0">
+              <a:rPr lang="en-US" sz="1050" dirty="0">
                 <a:solidFill>
                   <a:srgbClr val="7030A0"/>
                 </a:solidFill>
@@ -5048,7 +5026,7 @@
         </p:nvCxnSpPr>
         <p:spPr>
           <a:xfrm>
-            <a:off x="7277995" y="3034891"/>
+            <a:off x="7251806" y="3062244"/>
             <a:ext cx="434402" cy="641172"/>
           </a:xfrm>
           <a:prstGeom prst="bentConnector3">
@@ -5210,7 +5188,7 @@
           <a:p>
             <a:pPr algn="ctr"/>
             <a:r>
-              <a:rPr lang="en-US" sz="1050" dirty="0" smtClean="0">
+              <a:rPr lang="en-US" sz="1050" dirty="0">
                 <a:solidFill>
                   <a:srgbClr val="7030A0"/>
                 </a:solidFill>
@@ -5218,14 +5196,14 @@
               <a:t>&lt;&lt;interface&gt;&gt;</a:t>
             </a:r>
             <a:br>
-              <a:rPr lang="en-US" sz="1050" dirty="0" smtClean="0">
+              <a:rPr lang="en-US" sz="1050" dirty="0">
                 <a:solidFill>
                   <a:srgbClr val="7030A0"/>
                 </a:solidFill>
               </a:rPr>
             </a:br>
             <a:r>
-              <a:rPr lang="en-US" sz="1050" dirty="0" err="1" smtClean="0">
+              <a:rPr lang="en-US" sz="1050" dirty="0" err="1">
                 <a:solidFill>
                   <a:srgbClr val="7030A0"/>
                 </a:solidFill>
@@ -5264,7 +5242,7 @@
           <a:p>
             <a:pPr algn="r"/>
             <a:r>
-              <a:rPr lang="en-US" sz="1100" dirty="0" smtClean="0">
+              <a:rPr lang="en-US" sz="1100" dirty="0">
                 <a:solidFill>
                   <a:srgbClr val="7030A0"/>
                 </a:solidFill>
@@ -5320,20 +5298,12 @@
           <a:p>
             <a:pPr algn="ctr"/>
             <a:r>
-              <a:rPr lang="en-US" sz="1050" dirty="0" smtClean="0">
+              <a:rPr lang="en-US" sz="1050" dirty="0">
                 <a:solidFill>
                   <a:srgbClr val="7030A0"/>
                 </a:solidFill>
               </a:rPr>
               <a:t>&lt;&lt;interface&gt;&gt;</a:t>
-            </a:r>
-            <a:r>
-              <a:rPr lang="en-US" sz="1050">
-                <a:solidFill>
-                  <a:srgbClr val="7030A0"/>
-                </a:solidFill>
-              </a:rPr>
-              <a:t/>
             </a:r>
             <a:br>
               <a:rPr lang="en-US" sz="1050">
@@ -5343,7 +5313,7 @@
               </a:rPr>
             </a:br>
             <a:r>
-              <a:rPr lang="en-US" sz="1050" dirty="0" err="1" smtClean="0">
+              <a:rPr lang="en-US" sz="1050" dirty="0" err="1">
                 <a:solidFill>
                   <a:srgbClr val="7030A0"/>
                 </a:solidFill>
@@ -5465,7 +5435,7 @@
           <a:p>
             <a:pPr algn="ctr"/>
             <a:r>
-              <a:rPr lang="en-US" sz="1100" dirty="0" smtClean="0">
+              <a:rPr lang="en-US" sz="1100" dirty="0">
                 <a:solidFill>
                   <a:srgbClr val="7030A0"/>
                 </a:solidFill>
@@ -5504,7 +5474,7 @@
           <a:p>
             <a:pPr algn="ctr"/>
             <a:r>
-              <a:rPr lang="en-US" sz="1100" dirty="0" smtClean="0">
+              <a:rPr lang="en-US" sz="1100" dirty="0">
                 <a:solidFill>
                   <a:srgbClr val="7030A0"/>
                 </a:solidFill>
@@ -5543,7 +5513,7 @@
           <a:p>
             <a:pPr algn="ctr"/>
             <a:r>
-              <a:rPr lang="en-US" sz="1100" dirty="0" smtClean="0">
+              <a:rPr lang="en-US" sz="1100" dirty="0">
                 <a:solidFill>
                   <a:srgbClr val="7030A0"/>
                 </a:solidFill>
@@ -5582,7 +5552,7 @@
           <a:p>
             <a:pPr algn="ctr"/>
             <a:r>
-              <a:rPr lang="en-US" sz="1100" dirty="0" smtClean="0">
+              <a:rPr lang="en-US" sz="1100" dirty="0">
                 <a:solidFill>
                   <a:srgbClr val="7030A0"/>
                 </a:solidFill>
@@ -5621,7 +5591,7 @@
           <a:p>
             <a:pPr algn="ctr"/>
             <a:r>
-              <a:rPr lang="en-US" sz="1100" dirty="0" smtClean="0">
+              <a:rPr lang="en-US" sz="1100" dirty="0">
                 <a:solidFill>
                   <a:srgbClr val="7030A0"/>
                 </a:solidFill>
@@ -5660,7 +5630,7 @@
           <a:p>
             <a:pPr algn="ctr"/>
             <a:r>
-              <a:rPr lang="en-US" sz="1100" dirty="0" smtClean="0">
+              <a:rPr lang="en-US" sz="1100" dirty="0">
                 <a:solidFill>
                   <a:srgbClr val="7030A0"/>
                 </a:solidFill>
@@ -5699,7 +5669,7 @@
           <a:p>
             <a:pPr algn="ctr"/>
             <a:r>
-              <a:rPr lang="en-US" sz="1100" dirty="0" smtClean="0">
+              <a:rPr lang="en-US" sz="1100" dirty="0">
                 <a:solidFill>
                   <a:srgbClr val="7030A0"/>
                 </a:solidFill>
@@ -5738,7 +5708,7 @@
           <a:p>
             <a:pPr algn="ctr"/>
             <a:r>
-              <a:rPr lang="en-US" sz="1100" dirty="0" smtClean="0">
+              <a:rPr lang="en-US" sz="1100" dirty="0">
                 <a:solidFill>
                   <a:srgbClr val="7030A0"/>
                 </a:solidFill>
@@ -5753,6 +5723,705 @@
           </a:p>
         </p:txBody>
       </p:sp>
+      <p:cxnSp>
+        <p:nvCxnSpPr>
+          <p:cNvPr id="52" name="Elbow Connector 51">
+            <a:extLst>
+              <a:ext uri="{FF2B5EF4-FFF2-40B4-BE49-F238E27FC236}">
+                <a16:creationId xmlns:a16="http://schemas.microsoft.com/office/drawing/2014/main" id="{13107855-B70E-8549-8B03-A54477A49731}"/>
+              </a:ext>
+            </a:extLst>
+          </p:cNvPr>
+          <p:cNvCxnSpPr>
+            <a:cxnSpLocks/>
+          </p:cNvCxnSpPr>
+          <p:nvPr/>
+        </p:nvCxnSpPr>
+        <p:spPr>
+          <a:xfrm rot="16200000" flipH="1">
+            <a:off x="4192031" y="3155828"/>
+            <a:ext cx="565612" cy="252202"/>
+          </a:xfrm>
+          <a:prstGeom prst="bentConnector3">
+            <a:avLst>
+              <a:gd name="adj1" fmla="val 100214"/>
+            </a:avLst>
+          </a:prstGeom>
+          <a:ln w="19050">
+            <a:solidFill>
+              <a:schemeClr val="accent5"/>
+            </a:solidFill>
+            <a:headEnd type="none" w="med" len="med"/>
+            <a:tailEnd type="arrow" w="med" len="med"/>
+          </a:ln>
+          <a:effectLst/>
+        </p:spPr>
+        <p:style>
+          <a:lnRef idx="1">
+            <a:schemeClr val="accent2"/>
+          </a:lnRef>
+          <a:fillRef idx="2">
+            <a:schemeClr val="accent2"/>
+          </a:fillRef>
+          <a:effectRef idx="1">
+            <a:schemeClr val="accent2"/>
+          </a:effectRef>
+          <a:fontRef idx="minor">
+            <a:schemeClr val="dk1"/>
+          </a:fontRef>
+        </p:style>
+      </p:cxnSp>
+      <p:sp>
+        <p:nvSpPr>
+          <p:cNvPr id="71" name="Rectangle 8">
+            <a:extLst>
+              <a:ext uri="{FF2B5EF4-FFF2-40B4-BE49-F238E27FC236}">
+                <a16:creationId xmlns:a16="http://schemas.microsoft.com/office/drawing/2014/main" id="{3DD8A9C9-96E9-3647-8F02-0E61C301AC3A}"/>
+              </a:ext>
+            </a:extLst>
+          </p:cNvPr>
+          <p:cNvSpPr/>
+          <p:nvPr/>
+        </p:nvSpPr>
+        <p:spPr>
+          <a:xfrm>
+            <a:off x="4600938" y="3389105"/>
+            <a:ext cx="1156969" cy="346760"/>
+          </a:xfrm>
+          <a:prstGeom prst="rect">
+            <a:avLst/>
+          </a:prstGeom>
+          <a:gradFill>
+            <a:gsLst>
+              <a:gs pos="0">
+                <a:schemeClr val="accent5"/>
+              </a:gs>
+              <a:gs pos="35000">
+                <a:schemeClr val="accent5"/>
+              </a:gs>
+              <a:gs pos="100000">
+                <a:schemeClr val="accent5"/>
+              </a:gs>
+            </a:gsLst>
+          </a:gradFill>
+          <a:ln w="19050">
+            <a:solidFill>
+              <a:schemeClr val="accent5"/>
+            </a:solidFill>
+          </a:ln>
+          <a:effectLst/>
+        </p:spPr>
+        <p:style>
+          <a:lnRef idx="1">
+            <a:schemeClr val="accent4"/>
+          </a:lnRef>
+          <a:fillRef idx="2">
+            <a:schemeClr val="accent4"/>
+          </a:fillRef>
+          <a:effectRef idx="1">
+            <a:schemeClr val="accent4"/>
+          </a:effectRef>
+          <a:fontRef idx="minor">
+            <a:schemeClr val="dk1"/>
+          </a:fontRef>
+        </p:style>
+        <p:txBody>
+          <a:bodyPr rtlCol="0" anchor="ctr"/>
+          <a:lstStyle/>
+          <a:p>
+            <a:pPr algn="ctr"/>
+            <a:r>
+              <a:rPr lang="en-US" sz="1050" dirty="0" err="1">
+                <a:solidFill>
+                  <a:schemeClr val="bg1"/>
+                </a:solidFill>
+              </a:rPr>
+              <a:t>UserProfile</a:t>
+            </a:r>
+            <a:endParaRPr lang="en-SG" sz="1050" dirty="0">
+              <a:solidFill>
+                <a:schemeClr val="bg1"/>
+              </a:solidFill>
+            </a:endParaRPr>
+          </a:p>
+        </p:txBody>
+      </p:sp>
+      <p:sp>
+        <p:nvSpPr>
+          <p:cNvPr id="72" name="TextBox 71">
+            <a:extLst>
+              <a:ext uri="{FF2B5EF4-FFF2-40B4-BE49-F238E27FC236}">
+                <a16:creationId xmlns:a16="http://schemas.microsoft.com/office/drawing/2014/main" id="{C7B79511-2F99-114E-A74B-66C4BCF925F4}"/>
+              </a:ext>
+            </a:extLst>
+          </p:cNvPr>
+          <p:cNvSpPr txBox="1"/>
+          <p:nvPr/>
+        </p:nvSpPr>
+        <p:spPr>
+          <a:xfrm>
+            <a:off x="4343673" y="3581707"/>
+            <a:ext cx="189257" cy="195816"/>
+          </a:xfrm>
+          <a:prstGeom prst="rect">
+            <a:avLst/>
+          </a:prstGeom>
+          <a:noFill/>
+        </p:spPr>
+        <p:txBody>
+          <a:bodyPr wrap="square" lIns="0" tIns="0" rIns="0" bIns="0" rtlCol="0">
+            <a:noAutofit/>
+          </a:bodyPr>
+          <a:lstStyle/>
+          <a:p>
+            <a:pPr algn="ctr"/>
+            <a:r>
+              <a:rPr lang="en-US" sz="1100" dirty="0">
+                <a:solidFill>
+                  <a:srgbClr val="7030A0"/>
+                </a:solidFill>
+              </a:rPr>
+              <a:t>1</a:t>
+            </a:r>
+            <a:endParaRPr lang="en-SG" sz="1100" dirty="0">
+              <a:solidFill>
+                <a:srgbClr val="7030A0"/>
+              </a:solidFill>
+            </a:endParaRPr>
+          </a:p>
+        </p:txBody>
+      </p:sp>
+      <p:sp>
+        <p:nvSpPr>
+          <p:cNvPr id="73" name="Rectangle 8">
+            <a:extLst>
+              <a:ext uri="{FF2B5EF4-FFF2-40B4-BE49-F238E27FC236}">
+                <a16:creationId xmlns:a16="http://schemas.microsoft.com/office/drawing/2014/main" id="{528E17A6-13EA-B84F-8CD8-7AE66C56F364}"/>
+              </a:ext>
+            </a:extLst>
+          </p:cNvPr>
+          <p:cNvSpPr/>
+          <p:nvPr/>
+        </p:nvSpPr>
+        <p:spPr>
+          <a:xfrm>
+            <a:off x="3658607" y="4258086"/>
+            <a:ext cx="708186" cy="285783"/>
+          </a:xfrm>
+          <a:prstGeom prst="rect">
+            <a:avLst/>
+          </a:prstGeom>
+          <a:gradFill>
+            <a:gsLst>
+              <a:gs pos="0">
+                <a:schemeClr val="accent5"/>
+              </a:gs>
+              <a:gs pos="35000">
+                <a:schemeClr val="accent5"/>
+              </a:gs>
+              <a:gs pos="100000">
+                <a:schemeClr val="accent5"/>
+              </a:gs>
+            </a:gsLst>
+          </a:gradFill>
+          <a:ln w="19050">
+            <a:solidFill>
+              <a:schemeClr val="accent5"/>
+            </a:solidFill>
+          </a:ln>
+          <a:effectLst/>
+        </p:spPr>
+        <p:style>
+          <a:lnRef idx="1">
+            <a:schemeClr val="accent4"/>
+          </a:lnRef>
+          <a:fillRef idx="2">
+            <a:schemeClr val="accent4"/>
+          </a:fillRef>
+          <a:effectRef idx="1">
+            <a:schemeClr val="accent4"/>
+          </a:effectRef>
+          <a:fontRef idx="minor">
+            <a:schemeClr val="dk1"/>
+          </a:fontRef>
+        </p:style>
+        <p:txBody>
+          <a:bodyPr rtlCol="0" anchor="ctr"/>
+          <a:lstStyle/>
+          <a:p>
+            <a:pPr algn="ctr"/>
+            <a:r>
+              <a:rPr lang="en-US" sz="1050" dirty="0">
+                <a:solidFill>
+                  <a:schemeClr val="bg1"/>
+                </a:solidFill>
+              </a:rPr>
+              <a:t>Name </a:t>
+            </a:r>
+            <a:endParaRPr lang="en-SG" sz="1050" dirty="0">
+              <a:solidFill>
+                <a:schemeClr val="bg1"/>
+              </a:solidFill>
+            </a:endParaRPr>
+          </a:p>
+        </p:txBody>
+      </p:sp>
+      <p:sp>
+        <p:nvSpPr>
+          <p:cNvPr id="74" name="Flowchart: Decision 96">
+            <a:extLst>
+              <a:ext uri="{FF2B5EF4-FFF2-40B4-BE49-F238E27FC236}">
+                <a16:creationId xmlns:a16="http://schemas.microsoft.com/office/drawing/2014/main" id="{8C51F948-6F87-3D4C-BFB9-3EAF49EC1F2F}"/>
+              </a:ext>
+            </a:extLst>
+          </p:cNvPr>
+          <p:cNvSpPr/>
+          <p:nvPr/>
+        </p:nvSpPr>
+        <p:spPr>
+          <a:xfrm rot="5400000">
+            <a:off x="5053086" y="3775835"/>
+            <a:ext cx="236048" cy="173380"/>
+          </a:xfrm>
+          <a:prstGeom prst="flowChartDecision">
+            <a:avLst/>
+          </a:prstGeom>
+          <a:solidFill>
+            <a:schemeClr val="accent5"/>
+          </a:solidFill>
+          <a:ln w="19050">
+            <a:solidFill>
+              <a:schemeClr val="accent5"/>
+            </a:solidFill>
+          </a:ln>
+          <a:effectLst/>
+        </p:spPr>
+        <p:style>
+          <a:lnRef idx="1">
+            <a:schemeClr val="accent6"/>
+          </a:lnRef>
+          <a:fillRef idx="2">
+            <a:schemeClr val="accent6"/>
+          </a:fillRef>
+          <a:effectRef idx="1">
+            <a:schemeClr val="accent6"/>
+          </a:effectRef>
+          <a:fontRef idx="minor">
+            <a:schemeClr val="dk1"/>
+          </a:fontRef>
+        </p:style>
+        <p:txBody>
+          <a:bodyPr rtlCol="0" anchor="ctr"/>
+          <a:lstStyle/>
+          <a:p>
+            <a:pPr algn="ctr"/>
+            <a:endParaRPr lang="en-US" sz="1050"/>
+          </a:p>
+        </p:txBody>
+      </p:sp>
+      <p:sp>
+        <p:nvSpPr>
+          <p:cNvPr id="82" name="Rectangle 8">
+            <a:extLst>
+              <a:ext uri="{FF2B5EF4-FFF2-40B4-BE49-F238E27FC236}">
+                <a16:creationId xmlns:a16="http://schemas.microsoft.com/office/drawing/2014/main" id="{DFB7E6EA-64BF-4A4B-BA3A-1C958DD4BAFD}"/>
+              </a:ext>
+            </a:extLst>
+          </p:cNvPr>
+          <p:cNvSpPr/>
+          <p:nvPr/>
+        </p:nvSpPr>
+        <p:spPr>
+          <a:xfrm>
+            <a:off x="4442017" y="4260178"/>
+            <a:ext cx="708186" cy="285783"/>
+          </a:xfrm>
+          <a:prstGeom prst="rect">
+            <a:avLst/>
+          </a:prstGeom>
+          <a:gradFill>
+            <a:gsLst>
+              <a:gs pos="0">
+                <a:schemeClr val="accent5"/>
+              </a:gs>
+              <a:gs pos="35000">
+                <a:schemeClr val="accent5"/>
+              </a:gs>
+              <a:gs pos="100000">
+                <a:schemeClr val="accent5"/>
+              </a:gs>
+            </a:gsLst>
+          </a:gradFill>
+          <a:ln w="19050">
+            <a:solidFill>
+              <a:schemeClr val="accent5"/>
+            </a:solidFill>
+          </a:ln>
+          <a:effectLst/>
+        </p:spPr>
+        <p:style>
+          <a:lnRef idx="1">
+            <a:schemeClr val="accent4"/>
+          </a:lnRef>
+          <a:fillRef idx="2">
+            <a:schemeClr val="accent4"/>
+          </a:fillRef>
+          <a:effectRef idx="1">
+            <a:schemeClr val="accent4"/>
+          </a:effectRef>
+          <a:fontRef idx="minor">
+            <a:schemeClr val="dk1"/>
+          </a:fontRef>
+        </p:style>
+        <p:txBody>
+          <a:bodyPr rtlCol="0" anchor="ctr"/>
+          <a:lstStyle/>
+          <a:p>
+            <a:pPr algn="ctr"/>
+            <a:r>
+              <a:rPr lang="en-US" sz="1050" dirty="0">
+                <a:solidFill>
+                  <a:schemeClr val="bg1"/>
+                </a:solidFill>
+              </a:rPr>
+              <a:t>Phone</a:t>
+            </a:r>
+            <a:endParaRPr lang="en-SG" sz="1050" dirty="0">
+              <a:solidFill>
+                <a:schemeClr val="bg1"/>
+              </a:solidFill>
+            </a:endParaRPr>
+          </a:p>
+        </p:txBody>
+      </p:sp>
+      <p:sp>
+        <p:nvSpPr>
+          <p:cNvPr id="89" name="Rectangle 8">
+            <a:extLst>
+              <a:ext uri="{FF2B5EF4-FFF2-40B4-BE49-F238E27FC236}">
+                <a16:creationId xmlns:a16="http://schemas.microsoft.com/office/drawing/2014/main" id="{D5D866ED-4B12-F942-AF38-8FE120971869}"/>
+              </a:ext>
+            </a:extLst>
+          </p:cNvPr>
+          <p:cNvSpPr/>
+          <p:nvPr/>
+        </p:nvSpPr>
+        <p:spPr>
+          <a:xfrm>
+            <a:off x="5225427" y="4258086"/>
+            <a:ext cx="708186" cy="285783"/>
+          </a:xfrm>
+          <a:prstGeom prst="rect">
+            <a:avLst/>
+          </a:prstGeom>
+          <a:gradFill>
+            <a:gsLst>
+              <a:gs pos="0">
+                <a:schemeClr val="accent5"/>
+              </a:gs>
+              <a:gs pos="35000">
+                <a:schemeClr val="accent5"/>
+              </a:gs>
+              <a:gs pos="100000">
+                <a:schemeClr val="accent5"/>
+              </a:gs>
+            </a:gsLst>
+          </a:gradFill>
+          <a:ln w="19050">
+            <a:solidFill>
+              <a:schemeClr val="accent5"/>
+            </a:solidFill>
+          </a:ln>
+          <a:effectLst/>
+        </p:spPr>
+        <p:style>
+          <a:lnRef idx="1">
+            <a:schemeClr val="accent4"/>
+          </a:lnRef>
+          <a:fillRef idx="2">
+            <a:schemeClr val="accent4"/>
+          </a:fillRef>
+          <a:effectRef idx="1">
+            <a:schemeClr val="accent4"/>
+          </a:effectRef>
+          <a:fontRef idx="minor">
+            <a:schemeClr val="dk1"/>
+          </a:fontRef>
+        </p:style>
+        <p:txBody>
+          <a:bodyPr rtlCol="0" anchor="ctr"/>
+          <a:lstStyle/>
+          <a:p>
+            <a:pPr algn="ctr"/>
+            <a:r>
+              <a:rPr lang="en-US" sz="1050" dirty="0">
+                <a:solidFill>
+                  <a:schemeClr val="bg1"/>
+                </a:solidFill>
+              </a:rPr>
+              <a:t>Address</a:t>
+            </a:r>
+            <a:endParaRPr lang="en-SG" sz="1050" dirty="0">
+              <a:solidFill>
+                <a:schemeClr val="bg1"/>
+              </a:solidFill>
+            </a:endParaRPr>
+          </a:p>
+        </p:txBody>
+      </p:sp>
+      <p:cxnSp>
+        <p:nvCxnSpPr>
+          <p:cNvPr id="20" name="Straight Arrow Connector 19">
+            <a:extLst>
+              <a:ext uri="{FF2B5EF4-FFF2-40B4-BE49-F238E27FC236}">
+                <a16:creationId xmlns:a16="http://schemas.microsoft.com/office/drawing/2014/main" id="{D80DDF8A-1314-6E4A-B5B5-C32E7061ED2A}"/>
+              </a:ext>
+            </a:extLst>
+          </p:cNvPr>
+          <p:cNvCxnSpPr>
+            <a:cxnSpLocks/>
+            <a:stCxn id="74" idx="3"/>
+          </p:cNvCxnSpPr>
+          <p:nvPr/>
+        </p:nvCxnSpPr>
+        <p:spPr>
+          <a:xfrm flipH="1">
+            <a:off x="4827257" y="3980549"/>
+            <a:ext cx="343853" cy="258942"/>
+          </a:xfrm>
+          <a:prstGeom prst="straightConnector1">
+            <a:avLst/>
+          </a:prstGeom>
+          <a:ln w="19050">
+            <a:solidFill>
+              <a:schemeClr val="accent5"/>
+            </a:solidFill>
+            <a:tailEnd type="triangle"/>
+          </a:ln>
+        </p:spPr>
+        <p:style>
+          <a:lnRef idx="1">
+            <a:schemeClr val="accent1"/>
+          </a:lnRef>
+          <a:fillRef idx="0">
+            <a:schemeClr val="accent1"/>
+          </a:fillRef>
+          <a:effectRef idx="0">
+            <a:schemeClr val="accent1"/>
+          </a:effectRef>
+          <a:fontRef idx="minor">
+            <a:schemeClr val="tx1"/>
+          </a:fontRef>
+        </p:style>
+      </p:cxnSp>
+      <p:cxnSp>
+        <p:nvCxnSpPr>
+          <p:cNvPr id="90" name="Straight Arrow Connector 89">
+            <a:extLst>
+              <a:ext uri="{FF2B5EF4-FFF2-40B4-BE49-F238E27FC236}">
+                <a16:creationId xmlns:a16="http://schemas.microsoft.com/office/drawing/2014/main" id="{9093111D-F176-214C-A787-8AE093FBF087}"/>
+              </a:ext>
+            </a:extLst>
+          </p:cNvPr>
+          <p:cNvCxnSpPr>
+            <a:cxnSpLocks/>
+          </p:cNvCxnSpPr>
+          <p:nvPr/>
+        </p:nvCxnSpPr>
+        <p:spPr>
+          <a:xfrm flipH="1">
+            <a:off x="4081278" y="3980549"/>
+            <a:ext cx="1089834" cy="237971"/>
+          </a:xfrm>
+          <a:prstGeom prst="straightConnector1">
+            <a:avLst/>
+          </a:prstGeom>
+          <a:ln w="19050">
+            <a:solidFill>
+              <a:schemeClr val="accent5"/>
+            </a:solidFill>
+            <a:tailEnd type="triangle"/>
+          </a:ln>
+        </p:spPr>
+        <p:style>
+          <a:lnRef idx="1">
+            <a:schemeClr val="accent1"/>
+          </a:lnRef>
+          <a:fillRef idx="0">
+            <a:schemeClr val="accent1"/>
+          </a:fillRef>
+          <a:effectRef idx="0">
+            <a:schemeClr val="accent1"/>
+          </a:effectRef>
+          <a:fontRef idx="minor">
+            <a:schemeClr val="tx1"/>
+          </a:fontRef>
+        </p:style>
+      </p:cxnSp>
+      <p:cxnSp>
+        <p:nvCxnSpPr>
+          <p:cNvPr id="91" name="Straight Arrow Connector 90">
+            <a:extLst>
+              <a:ext uri="{FF2B5EF4-FFF2-40B4-BE49-F238E27FC236}">
+                <a16:creationId xmlns:a16="http://schemas.microsoft.com/office/drawing/2014/main" id="{CEF615B1-BE7C-CA4F-930F-0E4E749DB6EA}"/>
+              </a:ext>
+            </a:extLst>
+          </p:cNvPr>
+          <p:cNvCxnSpPr>
+            <a:cxnSpLocks/>
+            <a:stCxn id="74" idx="3"/>
+          </p:cNvCxnSpPr>
+          <p:nvPr/>
+        </p:nvCxnSpPr>
+        <p:spPr>
+          <a:xfrm>
+            <a:off x="5171110" y="3980549"/>
+            <a:ext cx="406845" cy="237971"/>
+          </a:xfrm>
+          <a:prstGeom prst="straightConnector1">
+            <a:avLst/>
+          </a:prstGeom>
+          <a:ln w="19050">
+            <a:solidFill>
+              <a:schemeClr val="accent5"/>
+            </a:solidFill>
+            <a:tailEnd type="triangle"/>
+          </a:ln>
+        </p:spPr>
+        <p:style>
+          <a:lnRef idx="1">
+            <a:schemeClr val="accent1"/>
+          </a:lnRef>
+          <a:fillRef idx="0">
+            <a:schemeClr val="accent1"/>
+          </a:fillRef>
+          <a:effectRef idx="0">
+            <a:schemeClr val="accent1"/>
+          </a:effectRef>
+          <a:fontRef idx="minor">
+            <a:schemeClr val="tx1"/>
+          </a:fontRef>
+        </p:style>
+      </p:cxnSp>
+      <p:sp>
+        <p:nvSpPr>
+          <p:cNvPr id="92" name="Rectangle 8">
+            <a:extLst>
+              <a:ext uri="{FF2B5EF4-FFF2-40B4-BE49-F238E27FC236}">
+                <a16:creationId xmlns:a16="http://schemas.microsoft.com/office/drawing/2014/main" id="{30F8A6E9-B17A-9B47-866A-4A87E7580189}"/>
+              </a:ext>
+            </a:extLst>
+          </p:cNvPr>
+          <p:cNvSpPr/>
+          <p:nvPr/>
+        </p:nvSpPr>
+        <p:spPr>
+          <a:xfrm>
+            <a:off x="6000860" y="4251859"/>
+            <a:ext cx="1250945" cy="285783"/>
+          </a:xfrm>
+          <a:prstGeom prst="rect">
+            <a:avLst/>
+          </a:prstGeom>
+          <a:gradFill>
+            <a:gsLst>
+              <a:gs pos="0">
+                <a:schemeClr val="accent5"/>
+              </a:gs>
+              <a:gs pos="35000">
+                <a:schemeClr val="accent5"/>
+              </a:gs>
+              <a:gs pos="100000">
+                <a:schemeClr val="accent5"/>
+              </a:gs>
+            </a:gsLst>
+          </a:gradFill>
+          <a:ln w="19050">
+            <a:solidFill>
+              <a:schemeClr val="accent5"/>
+            </a:solidFill>
+          </a:ln>
+          <a:effectLst/>
+        </p:spPr>
+        <p:style>
+          <a:lnRef idx="1">
+            <a:schemeClr val="accent4"/>
+          </a:lnRef>
+          <a:fillRef idx="2">
+            <a:schemeClr val="accent4"/>
+          </a:fillRef>
+          <a:effectRef idx="1">
+            <a:schemeClr val="accent4"/>
+          </a:effectRef>
+          <a:fontRef idx="minor">
+            <a:schemeClr val="dk1"/>
+          </a:fontRef>
+        </p:style>
+        <p:txBody>
+          <a:bodyPr rtlCol="0" anchor="ctr"/>
+          <a:lstStyle/>
+          <a:p>
+            <a:pPr algn="ctr"/>
+            <a:r>
+              <a:rPr lang="en-US" sz="1050" dirty="0" err="1">
+                <a:solidFill>
+                  <a:schemeClr val="bg1"/>
+                </a:solidFill>
+              </a:rPr>
+              <a:t>UniqueAllergyList</a:t>
+            </a:r>
+            <a:endParaRPr lang="en-SG" sz="1050" dirty="0">
+              <a:solidFill>
+                <a:schemeClr val="bg1"/>
+              </a:solidFill>
+            </a:endParaRPr>
+          </a:p>
+        </p:txBody>
+      </p:sp>
+      <p:cxnSp>
+        <p:nvCxnSpPr>
+          <p:cNvPr id="93" name="Straight Arrow Connector 92">
+            <a:extLst>
+              <a:ext uri="{FF2B5EF4-FFF2-40B4-BE49-F238E27FC236}">
+                <a16:creationId xmlns:a16="http://schemas.microsoft.com/office/drawing/2014/main" id="{14C865B3-D036-1048-A4D2-3361007E4A42}"/>
+              </a:ext>
+            </a:extLst>
+          </p:cNvPr>
+          <p:cNvCxnSpPr>
+            <a:cxnSpLocks/>
+          </p:cNvCxnSpPr>
+          <p:nvPr/>
+        </p:nvCxnSpPr>
+        <p:spPr>
+          <a:xfrm>
+            <a:off x="5177575" y="3975634"/>
+            <a:ext cx="1339486" cy="198689"/>
+          </a:xfrm>
+          <a:prstGeom prst="straightConnector1">
+            <a:avLst/>
+          </a:prstGeom>
+          <a:ln w="19050">
+            <a:solidFill>
+              <a:schemeClr val="accent5"/>
+            </a:solidFill>
+            <a:tailEnd type="triangle"/>
+          </a:ln>
+        </p:spPr>
+        <p:style>
+          <a:lnRef idx="1">
+            <a:schemeClr val="accent1"/>
+          </a:lnRef>
+          <a:fillRef idx="0">
+            <a:schemeClr val="accent1"/>
+          </a:fillRef>
+          <a:effectRef idx="0">
+            <a:schemeClr val="accent1"/>
+          </a:effectRef>
+          <a:fontRef idx="minor">
+            <a:schemeClr val="tx1"/>
+          </a:fontRef>
+        </p:style>
+      </p:cxnSp>
     </p:spTree>
     <p:extLst>
       <p:ext uri="{BB962C8B-B14F-4D97-AF65-F5344CB8AC3E}">
@@ -5763,13 +6432,6 @@
   <p:clrMapOvr>
     <a:masterClrMapping/>
   </p:clrMapOvr>
-  <p:timing>
-    <p:tnLst>
-      <p:par>
-        <p:cTn id="1" dur="indefinite" restart="never" nodeType="tmRoot"/>
-      </p:par>
-    </p:tnLst>
-  </p:timing>
 </p:sld>
 </file>
 

</xml_diff>